<commit_message>
Miscillaneous updates, nothing major
</commit_message>
<xml_diff>
--- a/Unit #1 Probability/Hot Hand Fallacy/HotHandFallacy.pptx
+++ b/Unit #1 Probability/Hot Hand Fallacy/HotHandFallacy.pptx
@@ -110,6 +110,11 @@
       </a:defRPr>
     </a:lvl9pPr>
   </p:defaultTextStyle>
+  <p:extLst>
+    <p:ext uri="{EFAFB233-063F-42B5-8137-9DF3F51BA10A}">
+      <p15:sldGuideLst xmlns:p15="http://schemas.microsoft.com/office/powerpoint/2012/main"/>
+    </p:ext>
+  </p:extLst>
 </p:presentation>
 </file>
 
@@ -244,7 +249,7 @@
           <a:p>
             <a:fld id="{AF6EEAC4-0493-40D2-8C4A-253EF60409B2}" type="datetimeFigureOut">
               <a:rPr lang="en-US" smtClean="0"/>
-              <a:t>8/6/2019</a:t>
+              <a:t>8/12/2019</a:t>
             </a:fld>
             <a:endParaRPr lang="en-US"/>
           </a:p>
@@ -414,7 +419,7 @@
           <a:p>
             <a:fld id="{AF6EEAC4-0493-40D2-8C4A-253EF60409B2}" type="datetimeFigureOut">
               <a:rPr lang="en-US" smtClean="0"/>
-              <a:t>8/6/2019</a:t>
+              <a:t>8/12/2019</a:t>
             </a:fld>
             <a:endParaRPr lang="en-US"/>
           </a:p>
@@ -594,7 +599,7 @@
           <a:p>
             <a:fld id="{AF6EEAC4-0493-40D2-8C4A-253EF60409B2}" type="datetimeFigureOut">
               <a:rPr lang="en-US" smtClean="0"/>
-              <a:t>8/6/2019</a:t>
+              <a:t>8/12/2019</a:t>
             </a:fld>
             <a:endParaRPr lang="en-US"/>
           </a:p>
@@ -764,7 +769,7 @@
           <a:p>
             <a:fld id="{AF6EEAC4-0493-40D2-8C4A-253EF60409B2}" type="datetimeFigureOut">
               <a:rPr lang="en-US" smtClean="0"/>
-              <a:t>8/6/2019</a:t>
+              <a:t>8/12/2019</a:t>
             </a:fld>
             <a:endParaRPr lang="en-US"/>
           </a:p>
@@ -1010,7 +1015,7 @@
           <a:p>
             <a:fld id="{AF6EEAC4-0493-40D2-8C4A-253EF60409B2}" type="datetimeFigureOut">
               <a:rPr lang="en-US" smtClean="0"/>
-              <a:t>8/6/2019</a:t>
+              <a:t>8/12/2019</a:t>
             </a:fld>
             <a:endParaRPr lang="en-US"/>
           </a:p>
@@ -1242,7 +1247,7 @@
           <a:p>
             <a:fld id="{AF6EEAC4-0493-40D2-8C4A-253EF60409B2}" type="datetimeFigureOut">
               <a:rPr lang="en-US" smtClean="0"/>
-              <a:t>8/6/2019</a:t>
+              <a:t>8/12/2019</a:t>
             </a:fld>
             <a:endParaRPr lang="en-US"/>
           </a:p>
@@ -1609,7 +1614,7 @@
           <a:p>
             <a:fld id="{AF6EEAC4-0493-40D2-8C4A-253EF60409B2}" type="datetimeFigureOut">
               <a:rPr lang="en-US" smtClean="0"/>
-              <a:t>8/6/2019</a:t>
+              <a:t>8/12/2019</a:t>
             </a:fld>
             <a:endParaRPr lang="en-US"/>
           </a:p>
@@ -1727,7 +1732,7 @@
           <a:p>
             <a:fld id="{AF6EEAC4-0493-40D2-8C4A-253EF60409B2}" type="datetimeFigureOut">
               <a:rPr lang="en-US" smtClean="0"/>
-              <a:t>8/6/2019</a:t>
+              <a:t>8/12/2019</a:t>
             </a:fld>
             <a:endParaRPr lang="en-US"/>
           </a:p>
@@ -1822,7 +1827,7 @@
           <a:p>
             <a:fld id="{AF6EEAC4-0493-40D2-8C4A-253EF60409B2}" type="datetimeFigureOut">
               <a:rPr lang="en-US" smtClean="0"/>
-              <a:t>8/6/2019</a:t>
+              <a:t>8/12/2019</a:t>
             </a:fld>
             <a:endParaRPr lang="en-US"/>
           </a:p>
@@ -2099,7 +2104,7 @@
           <a:p>
             <a:fld id="{AF6EEAC4-0493-40D2-8C4A-253EF60409B2}" type="datetimeFigureOut">
               <a:rPr lang="en-US" smtClean="0"/>
-              <a:t>8/6/2019</a:t>
+              <a:t>8/12/2019</a:t>
             </a:fld>
             <a:endParaRPr lang="en-US"/>
           </a:p>
@@ -2352,7 +2357,7 @@
           <a:p>
             <a:fld id="{AF6EEAC4-0493-40D2-8C4A-253EF60409B2}" type="datetimeFigureOut">
               <a:rPr lang="en-US" smtClean="0"/>
-              <a:t>8/6/2019</a:t>
+              <a:t>8/12/2019</a:t>
             </a:fld>
             <a:endParaRPr lang="en-US"/>
           </a:p>
@@ -2565,7 +2570,7 @@
           <a:p>
             <a:fld id="{AF6EEAC4-0493-40D2-8C4A-253EF60409B2}" type="datetimeFigureOut">
               <a:rPr lang="en-US" smtClean="0"/>
-              <a:t>8/6/2019</a:t>
+              <a:t>8/12/2019</a:t>
             </a:fld>
             <a:endParaRPr lang="en-US"/>
           </a:p>
@@ -3208,9 +3213,88 @@
   <p:timing>
     <p:tnLst>
       <p:par>
-        <p:cTn id="1" dur="indefinite" restart="never" nodeType="tmRoot"/>
+        <p:cTn id="1" dur="indefinite" restart="never" nodeType="tmRoot">
+          <p:childTnLst>
+            <p:seq concurrent="1" nextAc="seek">
+              <p:cTn id="2" dur="indefinite" nodeType="mainSeq">
+                <p:childTnLst>
+                  <p:par>
+                    <p:cTn id="3" fill="hold">
+                      <p:stCondLst>
+                        <p:cond delay="indefinite"/>
+                      </p:stCondLst>
+                      <p:childTnLst>
+                        <p:par>
+                          <p:cTn id="4" fill="hold">
+                            <p:stCondLst>
+                              <p:cond delay="0"/>
+                            </p:stCondLst>
+                            <p:childTnLst>
+                              <p:par>
+                                <p:cTn id="5" presetID="10" presetClass="entr" presetSubtype="0" fill="hold" grpId="0" nodeType="clickEffect">
+                                  <p:stCondLst>
+                                    <p:cond delay="0"/>
+                                  </p:stCondLst>
+                                  <p:childTnLst>
+                                    <p:set>
+                                      <p:cBhvr>
+                                        <p:cTn id="6" dur="1" fill="hold">
+                                          <p:stCondLst>
+                                            <p:cond delay="0"/>
+                                          </p:stCondLst>
+                                        </p:cTn>
+                                        <p:tgtEl>
+                                          <p:spTgt spid="7"/>
+                                        </p:tgtEl>
+                                        <p:attrNameLst>
+                                          <p:attrName>style.visibility</p:attrName>
+                                        </p:attrNameLst>
+                                      </p:cBhvr>
+                                      <p:to>
+                                        <p:strVal val="visible"/>
+                                      </p:to>
+                                    </p:set>
+                                    <p:animEffect transition="in" filter="fade">
+                                      <p:cBhvr>
+                                        <p:cTn id="7" dur="500"/>
+                                        <p:tgtEl>
+                                          <p:spTgt spid="7"/>
+                                        </p:tgtEl>
+                                      </p:cBhvr>
+                                    </p:animEffect>
+                                  </p:childTnLst>
+                                </p:cTn>
+                              </p:par>
+                            </p:childTnLst>
+                          </p:cTn>
+                        </p:par>
+                      </p:childTnLst>
+                    </p:cTn>
+                  </p:par>
+                </p:childTnLst>
+              </p:cTn>
+              <p:prevCondLst>
+                <p:cond evt="onPrev" delay="0">
+                  <p:tgtEl>
+                    <p:sldTgt/>
+                  </p:tgtEl>
+                </p:cond>
+              </p:prevCondLst>
+              <p:nextCondLst>
+                <p:cond evt="onNext" delay="0">
+                  <p:tgtEl>
+                    <p:sldTgt/>
+                  </p:tgtEl>
+                </p:cond>
+              </p:nextCondLst>
+            </p:seq>
+          </p:childTnLst>
+        </p:cTn>
       </p:par>
     </p:tnLst>
+    <p:bldLst>
+      <p:bldP spid="7" grpId="0"/>
+    </p:bldLst>
   </p:timing>
 </p:sld>
 </file>
@@ -19709,8 +19793,8 @@
           </a:graphicData>
         </a:graphic>
       </p:graphicFrame>
-      <mc:AlternateContent xmlns:mc="http://schemas.openxmlformats.org/markup-compatibility/2006">
-        <mc:Choice xmlns:a14="http://schemas.microsoft.com/office/drawing/2010/main" Requires="a14">
+      <mc:AlternateContent xmlns:mc="http://schemas.openxmlformats.org/markup-compatibility/2006" xmlns:a14="http://schemas.microsoft.com/office/drawing/2010/main">
+        <mc:Choice Requires="a14">
           <p:sp>
             <p:nvSpPr>
               <p:cNvPr id="3" name="TextBox 2"/>
@@ -19777,7 +19861,7 @@
             </p:txBody>
           </p:sp>
         </mc:Choice>
-        <mc:Fallback>
+        <mc:Fallback xmlns="">
           <p:sp>
             <p:nvSpPr>
               <p:cNvPr id="3" name="TextBox 2"/>
@@ -20584,8 +20668,8 @@
           </a:graphicData>
         </a:graphic>
       </p:graphicFrame>
-      <mc:AlternateContent xmlns:mc="http://schemas.openxmlformats.org/markup-compatibility/2006">
-        <mc:Choice xmlns:a14="http://schemas.microsoft.com/office/drawing/2010/main" Requires="a14">
+      <mc:AlternateContent xmlns:mc="http://schemas.openxmlformats.org/markup-compatibility/2006" xmlns:a14="http://schemas.microsoft.com/office/drawing/2010/main">
+        <mc:Choice Requires="a14">
           <p:sp>
             <p:nvSpPr>
               <p:cNvPr id="10" name="TextBox 9"/>
@@ -20652,7 +20736,7 @@
             </p:txBody>
           </p:sp>
         </mc:Choice>
-        <mc:Fallback>
+        <mc:Fallback xmlns="">
           <p:sp>
             <p:nvSpPr>
               <p:cNvPr id="10" name="TextBox 9"/>

</xml_diff>